<commit_message>
Start working on support more multi energy meters
</commit_message>
<xml_diff>
--- a/doc/pdf/PlaatEnergy Oostpoort.pptx
+++ b/doc/pdf/PlaatEnergy Oostpoort.pptx
@@ -5365,7 +5365,6 @@
               <a:rPr lang="en-US" dirty="0" smtClean="0"/>
               <a:t>Meter 2</a:t>
             </a:r>
-            <a:endParaRPr lang="en-US" dirty="0" smtClean="0"/>
           </a:p>
         </p:txBody>
       </p:sp>
@@ -5418,7 +5417,6 @@
               <a:rPr lang="en-US" dirty="0" smtClean="0"/>
               <a:t>Meter 1 </a:t>
             </a:r>
-            <a:endParaRPr lang="en-US" dirty="0" smtClean="0"/>
           </a:p>
         </p:txBody>
       </p:sp>
@@ -6233,7 +6231,7 @@
         </p:blipFill>
         <p:spPr bwMode="auto">
           <a:xfrm>
-            <a:off x="467544" y="5373216"/>
+            <a:off x="395536" y="5445224"/>
             <a:ext cx="1080120" cy="785183"/>
           </a:xfrm>
           <a:prstGeom prst="rect">
@@ -6833,7 +6831,6 @@
               <a:rPr lang="en-US" dirty="0" smtClean="0"/>
               <a:t>Meter 1</a:t>
             </a:r>
-            <a:endParaRPr lang="en-US" dirty="0" smtClean="0"/>
           </a:p>
         </p:txBody>
       </p:sp>
@@ -8480,11 +8477,7 @@
             </a:r>
             <a:r>
               <a:rPr lang="nl-NL" sz="2000" dirty="0" smtClean="0"/>
-              <a:t>moeten vervangen </a:t>
-            </a:r>
-            <a:r>
-              <a:rPr lang="nl-NL" sz="2000" dirty="0" smtClean="0"/>
-              <a:t>worden vanwege digitale gas meter. *</a:t>
+              <a:t>moeten vervangen worden vanwege digitale gas meter. *</a:t>
             </a:r>
             <a:endParaRPr lang="nl-NL" sz="2000" noProof="0" dirty="0" smtClean="0"/>
           </a:p>
@@ -8666,33 +8659,13 @@
           <a:p>
             <a:r>
               <a:rPr lang="nl-NL" sz="2000" dirty="0" smtClean="0"/>
-              <a:t>USB P1 Infrarood Kabel                  ca.  </a:t>
-            </a:r>
-            <a:r>
-              <a:rPr lang="nl-NL" sz="2000" dirty="0" smtClean="0"/>
-              <a:t>30</a:t>
-            </a:r>
-            <a:r>
-              <a:rPr lang="nl-NL" sz="2000" dirty="0" smtClean="0"/>
-              <a:t> </a:t>
-            </a:r>
-            <a:r>
-              <a:rPr lang="nl-NL" sz="2000" dirty="0" smtClean="0"/>
-              <a:t>euro</a:t>
+              <a:t>USB P1 Infrarood Kabel                  ca.  30 euro</a:t>
             </a:r>
           </a:p>
           <a:p>
             <a:r>
               <a:rPr lang="nl-NL" sz="2000" noProof="0" dirty="0" smtClean="0"/>
-              <a:t>HDMI Kabel  </a:t>
-            </a:r>
-            <a:r>
-              <a:rPr lang="nl-NL" sz="2000" noProof="0" dirty="0" smtClean="0"/>
-              <a:t>(3 meter)                   </a:t>
-            </a:r>
-            <a:r>
-              <a:rPr lang="nl-NL" sz="2000" noProof="0" dirty="0" smtClean="0"/>
-              <a:t>ca.   15 euro</a:t>
+              <a:t>HDMI Kabel  (3 meter)                   ca.   15 euro</a:t>
             </a:r>
           </a:p>
           <a:p>
@@ -9058,15 +9031,7 @@
             <a:pPr lvl="1"/>
             <a:r>
               <a:rPr lang="nl-NL" sz="2400" noProof="0" dirty="0" smtClean="0"/>
-              <a:t>Stap 1. Energie + Gas </a:t>
-            </a:r>
-            <a:r>
-              <a:rPr lang="nl-NL" sz="2400" noProof="0" dirty="0" smtClean="0"/>
-              <a:t>meters </a:t>
-            </a:r>
-            <a:r>
-              <a:rPr lang="nl-NL" sz="2400" noProof="0" dirty="0" smtClean="0"/>
-              <a:t>vervangen door digitale </a:t>
+              <a:t>Stap 1. Energie + Gas meters vervangen door digitale </a:t>
             </a:r>
             <a:r>
               <a:rPr lang="nl-NL" sz="2400" dirty="0" smtClean="0"/>
@@ -9085,13 +9050,8 @@
             <a:pPr lvl="2"/>
             <a:r>
               <a:rPr lang="nl-NL" sz="2000" dirty="0" smtClean="0"/>
-              <a:t>Deze informatie via beamer </a:t>
-            </a:r>
-            <a:r>
-              <a:rPr lang="nl-NL" sz="2000" dirty="0" smtClean="0"/>
-              <a:t>presenteren</a:t>
-            </a:r>
-            <a:endParaRPr lang="nl-NL" sz="2000" dirty="0" smtClean="0"/>
+              <a:t>Deze informatie via beamer presenteren</a:t>
+            </a:r>
           </a:p>
           <a:p>
             <a:pPr lvl="1"/>

</xml_diff>